<commit_message>
two sample test slides and one and two sample tests workshop added. old slides removed
</commit_message>
<xml_diff>
--- a/slides/04-one-sample-tests.pptx
+++ b/slides/04-one-sample-tests.pptx
@@ -57,19 +57,19 @@
   <p:notesSz cx="10233025" cy="7102475"/>
   <p:embeddedFontLst>
     <p:embeddedFont>
+      <p:font typeface="Calibri" panose="020F0502020204030204" pitchFamily="34" charset="0"/>
+      <p:regular r:id="rId45"/>
+      <p:bold r:id="rId46"/>
+      <p:italic r:id="rId47"/>
+      <p:boldItalic r:id="rId48"/>
+    </p:embeddedFont>
+    <p:embeddedFont>
       <p:font typeface="Lucida Console" panose="020B0609040504020204" pitchFamily="49" charset="0"/>
-      <p:regular r:id="rId45"/>
+      <p:regular r:id="rId49"/>
     </p:embeddedFont>
     <p:embeddedFont>
       <p:font typeface="Cambria Math" panose="02040503050406030204" pitchFamily="18" charset="0"/>
-      <p:regular r:id="rId46"/>
-    </p:embeddedFont>
-    <p:embeddedFont>
-      <p:font typeface="Calibri" panose="020F0502020204030204" pitchFamily="34" charset="0"/>
-      <p:regular r:id="rId47"/>
-      <p:bold r:id="rId48"/>
-      <p:italic r:id="rId49"/>
-      <p:boldItalic r:id="rId50"/>
+      <p:regular r:id="rId50"/>
     </p:embeddedFont>
   </p:embeddedFontLst>
   <p:custDataLst>
@@ -578,7 +578,7 @@
           <a:p>
             <a:fld id="{AE73D398-E230-4849-ACF3-479E420CB1EA}" type="datetimeFigureOut">
               <a:rPr lang="en-GB" smtClean="0"/>
-              <a:t>27/01/2021</a:t>
+              <a:t>09/02/2021</a:t>
             </a:fld>
             <a:endParaRPr lang="en-GB"/>
           </a:p>
@@ -743,7 +743,7 @@
           <a:p>
             <a:fld id="{8410BF60-2399-471B-88B8-98E5D19A2C28}" type="datetimeFigureOut">
               <a:rPr lang="en-GB" smtClean="0"/>
-              <a:t>27/01/2021</a:t>
+              <a:t>09/02/2021</a:t>
             </a:fld>
             <a:endParaRPr lang="en-GB"/>
           </a:p>
@@ -7150,7 +7150,7 @@
           <a:p>
             <a:fld id="{8D8741C9-1E1B-4FF3-A7E9-1243E9823EB4}" type="datetime1">
               <a:rPr lang="en-US" smtClean="0"/>
-              <a:t>1/27/2021</a:t>
+              <a:t>2/9/2021</a:t>
             </a:fld>
             <a:endParaRPr lang="en-US"/>
           </a:p>
@@ -7314,7 +7314,7 @@
           <a:p>
             <a:fld id="{A612FBD6-812A-4416-A980-4B9119C35DA5}" type="datetime1">
               <a:rPr lang="en-US" smtClean="0"/>
-              <a:t>1/27/2021</a:t>
+              <a:t>2/9/2021</a:t>
             </a:fld>
             <a:endParaRPr lang="en-US"/>
           </a:p>
@@ -7488,7 +7488,7 @@
           <a:p>
             <a:fld id="{36BDB8FA-BBB8-495B-B161-4F7BDFDDEDA3}" type="datetime1">
               <a:rPr lang="en-US" smtClean="0"/>
-              <a:t>1/27/2021</a:t>
+              <a:t>2/9/2021</a:t>
             </a:fld>
             <a:endParaRPr lang="en-US"/>
           </a:p>
@@ -7654,7 +7654,7 @@
           <a:p>
             <a:fld id="{E20C214B-656F-4D67-9F4A-70D59F6620AC}" type="datetime1">
               <a:rPr lang="en-US" smtClean="0"/>
-              <a:t>1/27/2021</a:t>
+              <a:t>2/9/2021</a:t>
             </a:fld>
             <a:endParaRPr lang="en-US"/>
           </a:p>
@@ -7773,7 +7773,7 @@
           <a:p>
             <a:fld id="{E20C214B-656F-4D67-9F4A-70D59F6620AC}" type="datetime1">
               <a:rPr lang="en-US" smtClean="0"/>
-              <a:t>1/27/2021</a:t>
+              <a:t>2/9/2021</a:t>
             </a:fld>
             <a:endParaRPr lang="en-US"/>
           </a:p>
@@ -7964,7 +7964,7 @@
           <a:p>
             <a:fld id="{C75385EC-3DC5-4FB3-BD46-054AE38A1DA3}" type="datetime1">
               <a:rPr lang="en-US" smtClean="0"/>
-              <a:t>1/27/2021</a:t>
+              <a:t>2/9/2021</a:t>
             </a:fld>
             <a:endParaRPr lang="en-US"/>
           </a:p>
@@ -8205,7 +8205,7 @@
           <a:p>
             <a:fld id="{2F304D26-DE6E-4F1A-B4D1-9E6E5BEF65E2}" type="datetime1">
               <a:rPr lang="en-US" smtClean="0"/>
-              <a:t>1/27/2021</a:t>
+              <a:t>2/9/2021</a:t>
             </a:fld>
             <a:endParaRPr lang="en-US"/>
           </a:p>
@@ -8486,7 +8486,7 @@
           <a:p>
             <a:fld id="{20DF7611-242A-4AB8-BF3D-8696A364C66C}" type="datetime1">
               <a:rPr lang="en-US" smtClean="0"/>
-              <a:t>1/27/2021</a:t>
+              <a:t>2/9/2021</a:t>
             </a:fld>
             <a:endParaRPr lang="en-US"/>
           </a:p>
@@ -8901,7 +8901,7 @@
           <a:p>
             <a:fld id="{DBB8C006-CEDD-4D5A-BF40-3F5AD76685BA}" type="datetime1">
               <a:rPr lang="en-US" smtClean="0"/>
-              <a:t>1/27/2021</a:t>
+              <a:t>2/9/2021</a:t>
             </a:fld>
             <a:endParaRPr lang="en-US"/>
           </a:p>
@@ -9014,7 +9014,7 @@
           <a:p>
             <a:fld id="{203F5178-2C49-4CC5-9BF1-3EA0F730AC68}" type="datetime1">
               <a:rPr lang="en-US" smtClean="0"/>
-              <a:t>1/27/2021</a:t>
+              <a:t>2/9/2021</a:t>
             </a:fld>
             <a:endParaRPr lang="en-US"/>
           </a:p>
@@ -9105,7 +9105,7 @@
           <a:p>
             <a:fld id="{CB5083F6-940C-434A-A58D-C14A68B618CE}" type="datetime1">
               <a:rPr lang="en-US" smtClean="0"/>
-              <a:t>1/27/2021</a:t>
+              <a:t>2/9/2021</a:t>
             </a:fld>
             <a:endParaRPr lang="en-US"/>
           </a:p>
@@ -9376,7 +9376,7 @@
           <a:p>
             <a:fld id="{6B69DB20-2F70-429C-8D6F-BD64D4D77F86}" type="datetime1">
               <a:rPr lang="en-US" smtClean="0"/>
-              <a:t>1/27/2021</a:t>
+              <a:t>2/9/2021</a:t>
             </a:fld>
             <a:endParaRPr lang="en-US"/>
           </a:p>
@@ -9624,7 +9624,7 @@
           <a:p>
             <a:fld id="{C1CA00C8-74D9-48C2-9E25-45761229EB05}" type="datetime1">
               <a:rPr lang="en-US" smtClean="0"/>
-              <a:t>1/27/2021</a:t>
+              <a:t>2/9/2021</a:t>
             </a:fld>
             <a:endParaRPr lang="en-US"/>
           </a:p>
@@ -9831,7 +9831,7 @@
           <a:p>
             <a:fld id="{E20C214B-656F-4D67-9F4A-70D59F6620AC}" type="datetime1">
               <a:rPr lang="en-US" smtClean="0"/>
-              <a:t>1/27/2021</a:t>
+              <a:t>2/9/2021</a:t>
             </a:fld>
             <a:endParaRPr lang="en-US"/>
           </a:p>
@@ -11888,13 +11888,8 @@
             </a:pPr>
             <a:r>
               <a:rPr lang="en-GB" sz="3200" dirty="0" smtClean="0"/>
-              <a:t>E.g. Log to remove </a:t>
-            </a:r>
-            <a:r>
-              <a:rPr lang="en-GB" sz="3200" dirty="0" smtClean="0"/>
-              <a:t>skew</a:t>
-            </a:r>
-            <a:endParaRPr lang="en-GB" sz="3200" dirty="0" smtClean="0"/>
+              <a:t>E.g. Log to remove skew</a:t>
+            </a:r>
           </a:p>
           <a:p>
             <a:pPr marL="457200" lvl="1" indent="-457200" eaLnBrk="1" hangingPunct="1">
@@ -12676,17 +12671,7 @@
                 <a:latin typeface="Lucida Console" panose="020B0609040504020204" pitchFamily="49" charset="0"/>
                 <a:cs typeface="Courier New" pitchFamily="49" charset="0"/>
               </a:rPr>
-              <a:t>plants</a:t>
-            </a:r>
-            <a:r>
-              <a:rPr lang="en-GB" altLang="en-US" sz="1500" dirty="0" smtClean="0">
-                <a:solidFill>
-                  <a:srgbClr val="3333FF"/>
-                </a:solidFill>
-                <a:latin typeface="Lucida Console" panose="020B0609040504020204" pitchFamily="49" charset="0"/>
-                <a:cs typeface="Courier New" pitchFamily="49" charset="0"/>
-              </a:rPr>
-              <a:t> </a:t>
+              <a:t>plants </a:t>
             </a:r>
             <a:r>
               <a:rPr lang="en-GB" altLang="en-US" sz="1500" dirty="0">
@@ -12839,17 +12824,7 @@
                 <a:latin typeface="Lucida Console" panose="020B0609040504020204" pitchFamily="49" charset="0"/>
                 <a:cs typeface="Courier New" pitchFamily="49" charset="0"/>
               </a:rPr>
-              <a:t>n = length(score</a:t>
-            </a:r>
-            <a:r>
-              <a:rPr lang="en-GB" altLang="en-US" sz="1500" dirty="0" smtClean="0">
-                <a:solidFill>
-                  <a:srgbClr val="3333FF"/>
-                </a:solidFill>
-                <a:latin typeface="Lucida Console" panose="020B0609040504020204" pitchFamily="49" charset="0"/>
-                <a:cs typeface="Courier New" pitchFamily="49" charset="0"/>
-              </a:rPr>
-              <a:t>))</a:t>
+              <a:t>n = length(score))</a:t>
             </a:r>
           </a:p>
           <a:p>
@@ -13124,7 +13099,6 @@
               <a:rPr lang="en-GB" dirty="0"/>
               <a:t>Data Analysis in R</a:t>
             </a:r>
-            <a:endParaRPr lang="en-GB" dirty="0"/>
           </a:p>
         </p:txBody>
       </p:sp>
@@ -13258,8 +13232,8 @@
           <a:chExt cx="0" cy="0"/>
         </a:xfrm>
       </p:grpSpPr>
-      <mc:AlternateContent xmlns:mc="http://schemas.openxmlformats.org/markup-compatibility/2006">
-        <mc:Choice xmlns:a14="http://schemas.microsoft.com/office/drawing/2010/main" Requires="a14">
+      <mc:AlternateContent xmlns:mc="http://schemas.openxmlformats.org/markup-compatibility/2006" xmlns:a14="http://schemas.microsoft.com/office/drawing/2010/main">
+        <mc:Choice Requires="a14">
           <p:sp>
             <p:nvSpPr>
               <p:cNvPr id="6147" name="Rectangle 3"/>
@@ -13503,7 +13477,7 @@
             </p:txBody>
           </p:sp>
         </mc:Choice>
-        <mc:Fallback>
+        <mc:Fallback xmlns="">
           <p:sp>
             <p:nvSpPr>
               <p:cNvPr id="6147" name="Rectangle 3"/>
@@ -15277,7 +15251,7 @@
             <a:graphicData uri="http://schemas.openxmlformats.org/presentationml/2006/ole">
               <mc:AlternateContent xmlns:mc="http://schemas.openxmlformats.org/markup-compatibility/2006">
                 <mc:Choice xmlns:v="urn:schemas-microsoft-com:vml" Requires="v">
-                  <p:oleObj spid="_x0000_s10497" name="Equation" r:id="rId4" imgW="647640" imgH="203040" progId="Equation.3">
+                  <p:oleObj spid="_x0000_s10498" name="Equation" r:id="rId4" imgW="647640" imgH="203040" progId="Equation.3">
                     <p:embed/>
                   </p:oleObj>
                 </mc:Choice>
@@ -16295,8 +16269,8 @@
           </a:p>
         </p:txBody>
       </p:sp>
-      <mc:AlternateContent xmlns:mc="http://schemas.openxmlformats.org/markup-compatibility/2006">
-        <mc:Choice xmlns:a14="http://schemas.microsoft.com/office/drawing/2010/main" Requires="a14">
+      <mc:AlternateContent xmlns:mc="http://schemas.openxmlformats.org/markup-compatibility/2006" xmlns:a14="http://schemas.microsoft.com/office/drawing/2010/main">
+        <mc:Choice Requires="a14">
           <p:sp>
             <p:nvSpPr>
               <p:cNvPr id="5" name="TextBox 4"/>
@@ -16319,6 +16293,7 @@
               </a:bodyPr>
               <a:lstStyle/>
               <a:p>
+                <a:pPr/>
                 <a14:m>
                   <m:oMathPara xmlns:m="http://schemas.openxmlformats.org/officeDocument/2006/math">
                     <m:oMathParaPr>
@@ -16329,7 +16304,7 @@
                         <m:accPr>
                           <m:chr m:val="̅"/>
                           <m:ctrlPr>
-                            <a:rPr lang="en-GB" sz="4400" smtClean="0">
+                            <a:rPr lang="en-GB" sz="4400" i="1" smtClean="0">
                               <a:latin typeface="Cambria Math" panose="02040503050406030204" pitchFamily="18" charset="0"/>
                             </a:rPr>
                           </m:ctrlPr>
@@ -16357,7 +16332,7 @@
             </p:txBody>
           </p:sp>
         </mc:Choice>
-        <mc:Fallback>
+        <mc:Fallback xmlns="">
           <p:sp>
             <p:nvSpPr>
               <p:cNvPr id="5" name="TextBox 4"/>
@@ -17365,17 +17340,7 @@
                 <a:latin typeface="Lucida Console" panose="020B0609040504020204" pitchFamily="49" charset="0"/>
                 <a:cs typeface="Courier New" pitchFamily="49" charset="0"/>
               </a:rPr>
-              <a:t>plants</a:t>
-            </a:r>
-            <a:r>
-              <a:rPr lang="en-GB" altLang="en-US" dirty="0" err="1" smtClean="0">
-                <a:solidFill>
-                  <a:srgbClr val="3333FF"/>
-                </a:solidFill>
-                <a:latin typeface="Lucida Console" panose="020B0609040504020204" pitchFamily="49" charset="0"/>
-                <a:cs typeface="Courier New" pitchFamily="49" charset="0"/>
-              </a:rPr>
-              <a:t>$score</a:t>
+              <a:t>plants$score</a:t>
             </a:r>
             <a:r>
               <a:rPr lang="en-GB" altLang="en-US" dirty="0">
@@ -17643,13 +17608,7 @@
               <a:rPr lang="en-GB" sz="3200" kern="0" dirty="0" smtClean="0">
                 <a:latin typeface="+mn-lt"/>
               </a:rPr>
-              <a:t>Checking the assumptions: normally and homogenously distributed </a:t>
-            </a:r>
-            <a:r>
-              <a:rPr lang="en-GB" sz="3200" kern="0" dirty="0" smtClean="0">
-                <a:latin typeface="+mn-lt"/>
-              </a:rPr>
-              <a:t>residuals</a:t>
+              <a:t>Checking the assumptions: normally and homogenously distributed residuals</a:t>
             </a:r>
             <a:endParaRPr lang="en-GB" sz="3200" kern="0" dirty="0">
               <a:latin typeface="+mn-lt"/>
@@ -18516,8 +18475,8 @@
           </a:p>
         </p:txBody>
       </p:sp>
-      <mc:AlternateContent xmlns:mc="http://schemas.openxmlformats.org/markup-compatibility/2006">
-        <mc:Choice xmlns:a14="http://schemas.microsoft.com/office/drawing/2010/main" Requires="a14">
+      <mc:AlternateContent xmlns:mc="http://schemas.openxmlformats.org/markup-compatibility/2006" xmlns:a14="http://schemas.microsoft.com/office/drawing/2010/main">
+        <mc:Choice Requires="a14">
           <p:sp>
             <p:nvSpPr>
               <p:cNvPr id="6147" name="Rectangle 3"/>
@@ -18628,7 +18587,7 @@
             </p:txBody>
           </p:sp>
         </mc:Choice>
-        <mc:Fallback>
+        <mc:Fallback xmlns="">
           <p:sp>
             <p:nvSpPr>
               <p:cNvPr id="6147" name="Rectangle 3"/>
@@ -19510,7 +19469,6 @@
               <a:rPr lang="en-US" dirty="0"/>
               <a:t>-test</a:t>
             </a:r>
-            <a:endParaRPr lang="en-US" dirty="0"/>
           </a:p>
         </p:txBody>
       </p:sp>
@@ -20730,8 +20688,8 @@
           <a:chExt cx="0" cy="0"/>
         </a:xfrm>
       </p:grpSpPr>
-      <mc:AlternateContent xmlns:mc="http://schemas.openxmlformats.org/markup-compatibility/2006">
-        <mc:Choice xmlns:a14="http://schemas.microsoft.com/office/drawing/2010/main" Requires="a14">
+      <mc:AlternateContent xmlns:mc="http://schemas.openxmlformats.org/markup-compatibility/2006" xmlns:a14="http://schemas.microsoft.com/office/drawing/2010/main">
+        <mc:Choice Requires="a14">
           <p:sp>
             <p:nvSpPr>
               <p:cNvPr id="6147" name="Rectangle 3"/>
@@ -21101,7 +21059,7 @@
             </p:txBody>
           </p:sp>
         </mc:Choice>
-        <mc:Fallback>
+        <mc:Fallback xmlns="">
           <p:sp>
             <p:nvSpPr>
               <p:cNvPr id="6147" name="Rectangle 3"/>
@@ -25067,15 +25025,7 @@
             </a:br>
             <a:r>
               <a:rPr lang="en-GB" altLang="en-US" dirty="0" smtClean="0"/>
-              <a:t>P</a:t>
-            </a:r>
-            <a:r>
-              <a:rPr lang="en-GB" altLang="en-US" dirty="0" smtClean="0"/>
-              <a:t>aired</a:t>
-            </a:r>
-            <a:r>
-              <a:rPr lang="en-GB" altLang="en-US" dirty="0" smtClean="0"/>
-              <a:t>-sample </a:t>
+              <a:t>Paired-sample </a:t>
             </a:r>
             <a:r>
               <a:rPr lang="en-GB" altLang="en-US" i="1" dirty="0"/>
@@ -27172,17 +27122,12 @@
             <a:pPr lvl="1"/>
             <a:r>
               <a:rPr lang="en-GB" dirty="0" smtClean="0"/>
-              <a:t>Activities to consolidate previous skills:  </a:t>
-            </a:r>
-            <a:r>
-              <a:rPr lang="en-GB" dirty="0" smtClean="0"/>
-              <a:t>Workflow </a:t>
+              <a:t>Activities to consolidate previous skills:  Workflow </a:t>
             </a:r>
             <a:r>
               <a:rPr lang="en-GB" dirty="0"/>
               <a:t>basics and projects</a:t>
             </a:r>
-            <a:endParaRPr lang="en-GB" dirty="0"/>
           </a:p>
         </p:txBody>
       </p:sp>
@@ -28709,7 +28654,6 @@
               <a:rPr lang="en-GB" dirty="0"/>
               <a:t>previous skills : Workflow basics and projects</a:t>
             </a:r>
-            <a:endParaRPr lang="en-GB" dirty="0"/>
           </a:p>
         </p:txBody>
       </p:sp>
@@ -29068,7 +29012,6 @@
               <a:rPr lang="en-GB" dirty="0"/>
               <a:t>previous skills : Workflow basics and projects</a:t>
             </a:r>
-            <a:endParaRPr lang="en-GB" dirty="0"/>
           </a:p>
         </p:txBody>
       </p:sp>
@@ -29426,15 +29369,7 @@
           <a:p>
             <a:r>
               <a:rPr lang="en-GB" dirty="0" smtClean="0"/>
-              <a:t>Recognise </a:t>
-            </a:r>
-            <a:r>
-              <a:rPr lang="en-GB" dirty="0" smtClean="0"/>
-              <a:t>when two samples are not in</a:t>
-            </a:r>
-            <a:r>
-              <a:rPr lang="en-GB" dirty="0" smtClean="0"/>
-              <a:t>dependent (</a:t>
+              <a:t>Recognise when two samples are not independent (</a:t>
             </a:r>
             <a:r>
               <a:rPr lang="en-GB" dirty="0"/>
@@ -29747,11 +29682,7 @@
             <a:pPr eaLnBrk="1" hangingPunct="1"/>
             <a:r>
               <a:rPr lang="en-GB" altLang="en-US" dirty="0" smtClean="0"/>
-              <a:t> Reminder: The </a:t>
-            </a:r>
-            <a:r>
-              <a:rPr lang="en-GB" altLang="en-US" dirty="0" smtClean="0"/>
-              <a:t>choice of test depends on ….</a:t>
+              <a:t> Reminder: The choice of test depends on ….</a:t>
             </a:r>
             <a:endParaRPr lang="en-GB" altLang="en-US" b="1" dirty="0" smtClean="0"/>
           </a:p>
@@ -29847,23 +29778,11 @@
             </a:pPr>
             <a:r>
               <a:rPr lang="en-GB" sz="2800" dirty="0" smtClean="0"/>
-              <a:t>Which is </a:t>
-            </a:r>
-            <a:r>
-              <a:rPr lang="en-GB" sz="2800" dirty="0" smtClean="0"/>
-              <a:t>the </a:t>
-            </a:r>
-            <a:r>
-              <a:rPr lang="en-GB" sz="2800" dirty="0" smtClean="0"/>
-              <a:t>response and which </a:t>
+              <a:t>Which is the response and which </a:t>
             </a:r>
             <a:r>
               <a:rPr lang="en-GB" dirty="0" smtClean="0"/>
-              <a:t>is/are explanatory</a:t>
-            </a:r>
-            <a:r>
-              <a:rPr lang="en-GB" dirty="0" smtClean="0"/>
-              <a:t>?</a:t>
+              <a:t>is/are explanatory?</a:t>
             </a:r>
           </a:p>
           <a:p>

</xml_diff>

<commit_message>
correction to one-sample slides
</commit_message>
<xml_diff>
--- a/slides/04-one-sample-tests.pptx
+++ b/slides/04-one-sample-tests.pptx
@@ -578,7 +578,7 @@
           <a:p>
             <a:fld id="{AE73D398-E230-4849-ACF3-479E420CB1EA}" type="datetimeFigureOut">
               <a:rPr lang="en-GB" smtClean="0"/>
-              <a:t>09/02/2021</a:t>
+              <a:t>01/03/2021</a:t>
             </a:fld>
             <a:endParaRPr lang="en-GB"/>
           </a:p>
@@ -743,7 +743,7 @@
           <a:p>
             <a:fld id="{8410BF60-2399-471B-88B8-98E5D19A2C28}" type="datetimeFigureOut">
               <a:rPr lang="en-GB" smtClean="0"/>
-              <a:t>09/02/2021</a:t>
+              <a:t>01/03/2021</a:t>
             </a:fld>
             <a:endParaRPr lang="en-GB"/>
           </a:p>
@@ -7150,7 +7150,7 @@
           <a:p>
             <a:fld id="{8D8741C9-1E1B-4FF3-A7E9-1243E9823EB4}" type="datetime1">
               <a:rPr lang="en-US" smtClean="0"/>
-              <a:t>2/9/2021</a:t>
+              <a:t>3/1/2021</a:t>
             </a:fld>
             <a:endParaRPr lang="en-US"/>
           </a:p>
@@ -7314,7 +7314,7 @@
           <a:p>
             <a:fld id="{A612FBD6-812A-4416-A980-4B9119C35DA5}" type="datetime1">
               <a:rPr lang="en-US" smtClean="0"/>
-              <a:t>2/9/2021</a:t>
+              <a:t>3/1/2021</a:t>
             </a:fld>
             <a:endParaRPr lang="en-US"/>
           </a:p>
@@ -7488,7 +7488,7 @@
           <a:p>
             <a:fld id="{36BDB8FA-BBB8-495B-B161-4F7BDFDDEDA3}" type="datetime1">
               <a:rPr lang="en-US" smtClean="0"/>
-              <a:t>2/9/2021</a:t>
+              <a:t>3/1/2021</a:t>
             </a:fld>
             <a:endParaRPr lang="en-US"/>
           </a:p>
@@ -7654,7 +7654,7 @@
           <a:p>
             <a:fld id="{E20C214B-656F-4D67-9F4A-70D59F6620AC}" type="datetime1">
               <a:rPr lang="en-US" smtClean="0"/>
-              <a:t>2/9/2021</a:t>
+              <a:t>3/1/2021</a:t>
             </a:fld>
             <a:endParaRPr lang="en-US"/>
           </a:p>
@@ -7773,7 +7773,7 @@
           <a:p>
             <a:fld id="{E20C214B-656F-4D67-9F4A-70D59F6620AC}" type="datetime1">
               <a:rPr lang="en-US" smtClean="0"/>
-              <a:t>2/9/2021</a:t>
+              <a:t>3/1/2021</a:t>
             </a:fld>
             <a:endParaRPr lang="en-US"/>
           </a:p>
@@ -7964,7 +7964,7 @@
           <a:p>
             <a:fld id="{C75385EC-3DC5-4FB3-BD46-054AE38A1DA3}" type="datetime1">
               <a:rPr lang="en-US" smtClean="0"/>
-              <a:t>2/9/2021</a:t>
+              <a:t>3/1/2021</a:t>
             </a:fld>
             <a:endParaRPr lang="en-US"/>
           </a:p>
@@ -8205,7 +8205,7 @@
           <a:p>
             <a:fld id="{2F304D26-DE6E-4F1A-B4D1-9E6E5BEF65E2}" type="datetime1">
               <a:rPr lang="en-US" smtClean="0"/>
-              <a:t>2/9/2021</a:t>
+              <a:t>3/1/2021</a:t>
             </a:fld>
             <a:endParaRPr lang="en-US"/>
           </a:p>
@@ -8486,7 +8486,7 @@
           <a:p>
             <a:fld id="{20DF7611-242A-4AB8-BF3D-8696A364C66C}" type="datetime1">
               <a:rPr lang="en-US" smtClean="0"/>
-              <a:t>2/9/2021</a:t>
+              <a:t>3/1/2021</a:t>
             </a:fld>
             <a:endParaRPr lang="en-US"/>
           </a:p>
@@ -8901,7 +8901,7 @@
           <a:p>
             <a:fld id="{DBB8C006-CEDD-4D5A-BF40-3F5AD76685BA}" type="datetime1">
               <a:rPr lang="en-US" smtClean="0"/>
-              <a:t>2/9/2021</a:t>
+              <a:t>3/1/2021</a:t>
             </a:fld>
             <a:endParaRPr lang="en-US"/>
           </a:p>
@@ -9014,7 +9014,7 @@
           <a:p>
             <a:fld id="{203F5178-2C49-4CC5-9BF1-3EA0F730AC68}" type="datetime1">
               <a:rPr lang="en-US" smtClean="0"/>
-              <a:t>2/9/2021</a:t>
+              <a:t>3/1/2021</a:t>
             </a:fld>
             <a:endParaRPr lang="en-US"/>
           </a:p>
@@ -9105,7 +9105,7 @@
           <a:p>
             <a:fld id="{CB5083F6-940C-434A-A58D-C14A68B618CE}" type="datetime1">
               <a:rPr lang="en-US" smtClean="0"/>
-              <a:t>2/9/2021</a:t>
+              <a:t>3/1/2021</a:t>
             </a:fld>
             <a:endParaRPr lang="en-US"/>
           </a:p>
@@ -9376,7 +9376,7 @@
           <a:p>
             <a:fld id="{6B69DB20-2F70-429C-8D6F-BD64D4D77F86}" type="datetime1">
               <a:rPr lang="en-US" smtClean="0"/>
-              <a:t>2/9/2021</a:t>
+              <a:t>3/1/2021</a:t>
             </a:fld>
             <a:endParaRPr lang="en-US"/>
           </a:p>
@@ -9624,7 +9624,7 @@
           <a:p>
             <a:fld id="{C1CA00C8-74D9-48C2-9E25-45761229EB05}" type="datetime1">
               <a:rPr lang="en-US" smtClean="0"/>
-              <a:t>2/9/2021</a:t>
+              <a:t>3/1/2021</a:t>
             </a:fld>
             <a:endParaRPr lang="en-US"/>
           </a:p>
@@ -9831,7 +9831,7 @@
           <a:p>
             <a:fld id="{E20C214B-656F-4D67-9F4A-70D59F6620AC}" type="datetime1">
               <a:rPr lang="en-US" smtClean="0"/>
-              <a:t>2/9/2021</a:t>
+              <a:t>3/1/2021</a:t>
             </a:fld>
             <a:endParaRPr lang="en-US"/>
           </a:p>
@@ -15251,7 +15251,7 @@
             <a:graphicData uri="http://schemas.openxmlformats.org/presentationml/2006/ole">
               <mc:AlternateContent xmlns:mc="http://schemas.openxmlformats.org/markup-compatibility/2006">
                 <mc:Choice xmlns:v="urn:schemas-microsoft-com:vml" Requires="v">
-                  <p:oleObj spid="_x0000_s10498" name="Equation" r:id="rId4" imgW="647640" imgH="203040" progId="Equation.3">
+                  <p:oleObj spid="_x0000_s10500" name="Equation" r:id="rId4" imgW="647640" imgH="203040" progId="Equation.3">
                     <p:embed/>
                   </p:oleObj>
                 </mc:Choice>
@@ -16478,73 +16478,28 @@
       </p:grpSpPr>
       <p:sp>
         <p:nvSpPr>
-          <p:cNvPr id="4" name="Rectangle 3"/>
-          <p:cNvSpPr/>
-          <p:nvPr/>
+          <p:cNvPr id="30723" name="Content Placeholder 2"/>
+          <p:cNvSpPr>
+            <a:spLocks noGrp="1"/>
+          </p:cNvSpPr>
+          <p:nvPr>
+            <p:ph idx="1"/>
+          </p:nvPr>
         </p:nvSpPr>
         <p:spPr>
           <a:xfrm>
-            <a:off x="609600" y="1993899"/>
-            <a:ext cx="7708970" cy="4254501"/>
+            <a:off x="762000" y="1600200"/>
+            <a:ext cx="8137525" cy="3200400"/>
           </a:xfrm>
-          <a:prstGeom prst="rect">
-            <a:avLst/>
-          </a:prstGeom>
           <a:solidFill>
             <a:schemeClr val="bg1">
               <a:lumMod val="95000"/>
             </a:schemeClr>
           </a:solidFill>
-          <a:ln>
-            <a:noFill/>
-          </a:ln>
         </p:spPr>
-        <p:style>
-          <a:lnRef idx="2">
-            <a:schemeClr val="accent1">
-              <a:shade val="50000"/>
-            </a:schemeClr>
-          </a:lnRef>
-          <a:fillRef idx="1">
-            <a:schemeClr val="accent1"/>
-          </a:fillRef>
-          <a:effectRef idx="0">
-            <a:schemeClr val="accent1"/>
-          </a:effectRef>
-          <a:fontRef idx="minor">
-            <a:schemeClr val="lt1"/>
-          </a:fontRef>
-        </p:style>
-        <p:txBody>
-          <a:bodyPr anchor="ctr"/>
-          <a:lstStyle/>
-          <a:p>
-            <a:pPr algn="ctr">
-              <a:defRPr/>
-            </a:pPr>
-            <a:endParaRPr lang="en-GB"/>
-          </a:p>
-        </p:txBody>
-      </p:sp>
-      <p:sp>
-        <p:nvSpPr>
-          <p:cNvPr id="30723" name="Content Placeholder 2"/>
-          <p:cNvSpPr>
-            <a:spLocks noGrp="1"/>
-          </p:cNvSpPr>
-          <p:nvPr>
-            <p:ph idx="1"/>
-          </p:nvPr>
-        </p:nvSpPr>
-        <p:spPr>
-          <a:xfrm>
-            <a:off x="755650" y="2098674"/>
-            <a:ext cx="8137525" cy="3768726"/>
-          </a:xfrm>
-        </p:spPr>
         <p:txBody>
           <a:bodyPr>
-            <a:normAutofit/>
+            <a:normAutofit fontScale="92500" lnSpcReduction="10000"/>
           </a:bodyPr>
           <a:lstStyle/>
           <a:p>
@@ -16553,34 +16508,24 @@
               <a:buNone/>
             </a:pPr>
             <a:r>
-              <a:rPr lang="it-IT" altLang="en-US" sz="1800" dirty="0">
+              <a:rPr lang="it-IT" altLang="en-US" sz="1800" dirty="0" smtClean="0">
                 <a:solidFill>
                   <a:srgbClr val="3333FF"/>
                 </a:solidFill>
                 <a:latin typeface="Lucida Console" panose="020B0609040504020204" pitchFamily="49" charset="0"/>
                 <a:cs typeface="Courier New" pitchFamily="49" charset="0"/>
               </a:rPr>
-              <a:t>t.test(data = </a:t>
-            </a:r>
-            <a:r>
-              <a:rPr lang="it-IT" altLang="en-US" sz="1800" dirty="0" smtClean="0">
+              <a:t>t.test(plants$score, </a:t>
+            </a:r>
+            <a:r>
+              <a:rPr lang="it-IT" altLang="en-US" sz="1800" dirty="0">
                 <a:solidFill>
                   <a:srgbClr val="3333FF"/>
                 </a:solidFill>
                 <a:latin typeface="Lucida Console" panose="020B0609040504020204" pitchFamily="49" charset="0"/>
                 <a:cs typeface="Courier New" pitchFamily="49" charset="0"/>
               </a:rPr>
-              <a:t>plants, </a:t>
-            </a:r>
-            <a:r>
-              <a:rPr lang="it-IT" altLang="en-US" sz="1800" dirty="0">
-                <a:solidFill>
-                  <a:srgbClr val="3333FF"/>
-                </a:solidFill>
-                <a:latin typeface="Lucida Console" panose="020B0609040504020204" pitchFamily="49" charset="0"/>
-                <a:cs typeface="Courier New" pitchFamily="49" charset="0"/>
-              </a:rPr>
-              <a:t>score, mu = </a:t>
+              <a:t>mu = </a:t>
             </a:r>
             <a:r>
               <a:rPr lang="it-IT" altLang="en-US" sz="1800" dirty="0" smtClean="0">
@@ -16635,8 +16580,25 @@
                 <a:latin typeface="Lucida Console" panose="020B0609040504020204" pitchFamily="49" charset="0"/>
                 <a:cs typeface="Courier New" pitchFamily="49" charset="0"/>
               </a:rPr>
-              <a:t>data:  score</a:t>
-            </a:r>
+              <a:t>data:  </a:t>
+            </a:r>
+            <a:r>
+              <a:rPr lang="en-GB" altLang="en-US" sz="1800" dirty="0" err="1" smtClean="0">
+                <a:solidFill>
+                  <a:srgbClr val="000000"/>
+                </a:solidFill>
+                <a:latin typeface="Lucida Console" panose="020B0609040504020204" pitchFamily="49" charset="0"/>
+                <a:cs typeface="Courier New" pitchFamily="49" charset="0"/>
+              </a:rPr>
+              <a:t>plants$score</a:t>
+            </a:r>
+            <a:endParaRPr lang="en-GB" altLang="en-US" sz="1800" dirty="0">
+              <a:solidFill>
+                <a:srgbClr val="000000"/>
+              </a:solidFill>
+              <a:latin typeface="Lucida Console" panose="020B0609040504020204" pitchFamily="49" charset="0"/>
+              <a:cs typeface="Courier New" pitchFamily="49" charset="0"/>
+            </a:endParaRPr>
           </a:p>
           <a:p>
             <a:pPr>
@@ -16883,6 +16845,229 @@
               <a:rPr lang="en-GB" altLang="en-US" dirty="0"/>
               <a:t>tests - example</a:t>
             </a:r>
+          </a:p>
+        </p:txBody>
+      </p:sp>
+      <p:sp>
+        <p:nvSpPr>
+          <p:cNvPr id="6" name="Content Placeholder 2"/>
+          <p:cNvSpPr txBox="1">
+            <a:spLocks/>
+          </p:cNvSpPr>
+          <p:nvPr/>
+        </p:nvSpPr>
+        <p:spPr>
+          <a:xfrm>
+            <a:off x="762000" y="5943600"/>
+            <a:ext cx="7952678" cy="533400"/>
+          </a:xfrm>
+          <a:prstGeom prst="rect">
+            <a:avLst/>
+          </a:prstGeom>
+          <a:solidFill>
+            <a:schemeClr val="bg1">
+              <a:lumMod val="95000"/>
+            </a:schemeClr>
+          </a:solidFill>
+        </p:spPr>
+        <p:txBody>
+          <a:bodyPr vert="horz" lIns="91440" tIns="45720" rIns="91440" bIns="45720" rtlCol="0">
+            <a:normAutofit fontScale="92500"/>
+          </a:bodyPr>
+          <a:lstStyle>
+            <a:lvl1pPr marL="342900" indent="-342900" algn="l" defTabSz="914400" rtl="0" eaLnBrk="1" latinLnBrk="0" hangingPunct="1">
+              <a:spcBef>
+                <a:spcPct val="20000"/>
+              </a:spcBef>
+              <a:buFont typeface="Arial" pitchFamily="34" charset="0"/>
+              <a:buChar char="•"/>
+              <a:defRPr sz="3200" kern="1200">
+                <a:solidFill>
+                  <a:schemeClr val="tx1"/>
+                </a:solidFill>
+                <a:latin typeface="+mn-lt"/>
+                <a:ea typeface="+mn-ea"/>
+                <a:cs typeface="+mn-cs"/>
+              </a:defRPr>
+            </a:lvl1pPr>
+            <a:lvl2pPr marL="742950" indent="-285750" algn="l" defTabSz="914400" rtl="0" eaLnBrk="1" latinLnBrk="0" hangingPunct="1">
+              <a:spcBef>
+                <a:spcPct val="20000"/>
+              </a:spcBef>
+              <a:buFont typeface="Arial" pitchFamily="34" charset="0"/>
+              <a:buChar char="–"/>
+              <a:defRPr sz="2800" kern="1200">
+                <a:solidFill>
+                  <a:schemeClr val="tx1"/>
+                </a:solidFill>
+                <a:latin typeface="+mn-lt"/>
+                <a:ea typeface="+mn-ea"/>
+                <a:cs typeface="+mn-cs"/>
+              </a:defRPr>
+            </a:lvl2pPr>
+            <a:lvl3pPr marL="1143000" indent="-228600" algn="l" defTabSz="914400" rtl="0" eaLnBrk="1" latinLnBrk="0" hangingPunct="1">
+              <a:spcBef>
+                <a:spcPct val="20000"/>
+              </a:spcBef>
+              <a:buFont typeface="Arial" pitchFamily="34" charset="0"/>
+              <a:buChar char="•"/>
+              <a:defRPr sz="2400" kern="1200">
+                <a:solidFill>
+                  <a:schemeClr val="tx1"/>
+                </a:solidFill>
+                <a:latin typeface="+mn-lt"/>
+                <a:ea typeface="+mn-ea"/>
+                <a:cs typeface="+mn-cs"/>
+              </a:defRPr>
+            </a:lvl3pPr>
+            <a:lvl4pPr marL="1600200" indent="-228600" algn="l" defTabSz="914400" rtl="0" eaLnBrk="1" latinLnBrk="0" hangingPunct="1">
+              <a:spcBef>
+                <a:spcPct val="20000"/>
+              </a:spcBef>
+              <a:buFont typeface="Arial" pitchFamily="34" charset="0"/>
+              <a:buChar char="–"/>
+              <a:defRPr sz="2000" kern="1200">
+                <a:solidFill>
+                  <a:schemeClr val="tx1"/>
+                </a:solidFill>
+                <a:latin typeface="+mn-lt"/>
+                <a:ea typeface="+mn-ea"/>
+                <a:cs typeface="+mn-cs"/>
+              </a:defRPr>
+            </a:lvl4pPr>
+            <a:lvl5pPr marL="2057400" indent="-228600" algn="l" defTabSz="914400" rtl="0" eaLnBrk="1" latinLnBrk="0" hangingPunct="1">
+              <a:spcBef>
+                <a:spcPct val="20000"/>
+              </a:spcBef>
+              <a:buFont typeface="Arial" pitchFamily="34" charset="0"/>
+              <a:buChar char="»"/>
+              <a:defRPr sz="2000" kern="1200">
+                <a:solidFill>
+                  <a:schemeClr val="tx1"/>
+                </a:solidFill>
+                <a:latin typeface="+mn-lt"/>
+                <a:ea typeface="+mn-ea"/>
+                <a:cs typeface="+mn-cs"/>
+              </a:defRPr>
+            </a:lvl5pPr>
+            <a:lvl6pPr marL="2514600" indent="-228600" algn="l" defTabSz="914400" rtl="0" eaLnBrk="1" latinLnBrk="0" hangingPunct="1">
+              <a:spcBef>
+                <a:spcPct val="20000"/>
+              </a:spcBef>
+              <a:buFont typeface="Arial" pitchFamily="34" charset="0"/>
+              <a:buChar char="•"/>
+              <a:defRPr sz="2000" kern="1200">
+                <a:solidFill>
+                  <a:schemeClr val="tx1"/>
+                </a:solidFill>
+                <a:latin typeface="+mn-lt"/>
+                <a:ea typeface="+mn-ea"/>
+                <a:cs typeface="+mn-cs"/>
+              </a:defRPr>
+            </a:lvl6pPr>
+            <a:lvl7pPr marL="2971800" indent="-228600" algn="l" defTabSz="914400" rtl="0" eaLnBrk="1" latinLnBrk="0" hangingPunct="1">
+              <a:spcBef>
+                <a:spcPct val="20000"/>
+              </a:spcBef>
+              <a:buFont typeface="Arial" pitchFamily="34" charset="0"/>
+              <a:buChar char="•"/>
+              <a:defRPr sz="2000" kern="1200">
+                <a:solidFill>
+                  <a:schemeClr val="tx1"/>
+                </a:solidFill>
+                <a:latin typeface="+mn-lt"/>
+                <a:ea typeface="+mn-ea"/>
+                <a:cs typeface="+mn-cs"/>
+              </a:defRPr>
+            </a:lvl7pPr>
+            <a:lvl8pPr marL="3429000" indent="-228600" algn="l" defTabSz="914400" rtl="0" eaLnBrk="1" latinLnBrk="0" hangingPunct="1">
+              <a:spcBef>
+                <a:spcPct val="20000"/>
+              </a:spcBef>
+              <a:buFont typeface="Arial" pitchFamily="34" charset="0"/>
+              <a:buChar char="•"/>
+              <a:defRPr sz="2000" kern="1200">
+                <a:solidFill>
+                  <a:schemeClr val="tx1"/>
+                </a:solidFill>
+                <a:latin typeface="+mn-lt"/>
+                <a:ea typeface="+mn-ea"/>
+                <a:cs typeface="+mn-cs"/>
+              </a:defRPr>
+            </a:lvl8pPr>
+            <a:lvl9pPr marL="3886200" indent="-228600" algn="l" defTabSz="914400" rtl="0" eaLnBrk="1" latinLnBrk="0" hangingPunct="1">
+              <a:spcBef>
+                <a:spcPct val="20000"/>
+              </a:spcBef>
+              <a:buFont typeface="Arial" pitchFamily="34" charset="0"/>
+              <a:buChar char="•"/>
+              <a:defRPr sz="2000" kern="1200">
+                <a:solidFill>
+                  <a:schemeClr val="tx1"/>
+                </a:solidFill>
+                <a:latin typeface="+mn-lt"/>
+                <a:ea typeface="+mn-ea"/>
+                <a:cs typeface="+mn-cs"/>
+              </a:defRPr>
+            </a:lvl9pPr>
+          </a:lstStyle>
+          <a:p>
+            <a:pPr>
+              <a:buFont typeface="Wingdings" pitchFamily="2" charset="2"/>
+              <a:buNone/>
+            </a:pPr>
+            <a:r>
+              <a:rPr lang="it-IT" altLang="en-US" sz="1800" dirty="0">
+                <a:solidFill>
+                  <a:srgbClr val="3333FF"/>
+                </a:solidFill>
+                <a:latin typeface="Lucida Console" panose="020B0609040504020204" pitchFamily="49" charset="0"/>
+                <a:cs typeface="Courier New" pitchFamily="49" charset="0"/>
+              </a:rPr>
+              <a:t>t.test(data = plants, score ~ 1, mu = 76)</a:t>
+            </a:r>
+            <a:r>
+              <a:rPr lang="en-GB" altLang="en-US" sz="1800" dirty="0" smtClean="0">
+                <a:solidFill>
+                  <a:srgbClr val="000000"/>
+                </a:solidFill>
+                <a:latin typeface="Lucida Console" panose="020B0609040504020204" pitchFamily="49" charset="0"/>
+                <a:cs typeface="Courier New" pitchFamily="49" charset="0"/>
+              </a:rPr>
+              <a:t>			</a:t>
+            </a:r>
+          </a:p>
+        </p:txBody>
+      </p:sp>
+      <p:sp>
+        <p:nvSpPr>
+          <p:cNvPr id="8" name="Rectangle 7"/>
+          <p:cNvSpPr/>
+          <p:nvPr/>
+        </p:nvSpPr>
+        <p:spPr>
+          <a:xfrm>
+            <a:off x="762000" y="5077853"/>
+            <a:ext cx="8077200" cy="461665"/>
+          </a:xfrm>
+          <a:prstGeom prst="rect">
+            <a:avLst/>
+          </a:prstGeom>
+        </p:spPr>
+        <p:txBody>
+          <a:bodyPr wrap="square">
+            <a:spAutoFit/>
+          </a:bodyPr>
+          <a:lstStyle/>
+          <a:p>
+            <a:pPr marL="0" lvl="1">
+              <a:defRPr/>
+            </a:pPr>
+            <a:r>
+              <a:rPr lang="en-GB" sz="2400" dirty="0" smtClean="0"/>
+              <a:t>Note: you can also use</a:t>
+            </a:r>
+            <a:endParaRPr lang="en-GB" sz="2400" dirty="0"/>
           </a:p>
         </p:txBody>
       </p:sp>
@@ -19271,28 +19456,16 @@
           <a:p>
             <a:pPr lvl="1"/>
             <a:r>
-              <a:rPr lang="it-IT" sz="2000" kern="0" dirty="0">
+              <a:rPr lang="it-IT" sz="2000" kern="0" dirty="0" smtClean="0">
                 <a:latin typeface="Lucida Console" panose="020B0609040504020204" pitchFamily="49" charset="0"/>
               </a:rPr>
-              <a:t>t.test(data = </a:t>
+              <a:t>t.test(</a:t>
             </a:r>
             <a:r>
               <a:rPr lang="it-IT" sz="2000" i="1" kern="0" dirty="0" smtClean="0">
                 <a:latin typeface="Lucida Console" panose="020B0609040504020204" pitchFamily="49" charset="0"/>
               </a:rPr>
-              <a:t>df</a:t>
-            </a:r>
-            <a:r>
-              <a:rPr lang="it-IT" sz="2000" kern="0" dirty="0" smtClean="0">
-                <a:latin typeface="Lucida Console" panose="020B0609040504020204" pitchFamily="49" charset="0"/>
-              </a:rPr>
-              <a:t>, </a:t>
-            </a:r>
-            <a:r>
-              <a:rPr lang="it-IT" sz="2000" i="1" kern="0" dirty="0" smtClean="0">
-                <a:latin typeface="Lucida Console" panose="020B0609040504020204" pitchFamily="49" charset="0"/>
-              </a:rPr>
-              <a:t>response</a:t>
+              <a:t>df$response</a:t>
             </a:r>
             <a:r>
               <a:rPr lang="it-IT" sz="2000" kern="0" dirty="0" smtClean="0">

</xml_diff>

<commit_message>
correction to t value in one sample t on slides
</commit_message>
<xml_diff>
--- a/slides/04-one-sample-tests.pptx
+++ b/slides/04-one-sample-tests.pptx
@@ -57,19 +57,19 @@
   <p:notesSz cx="10233025" cy="7102475"/>
   <p:embeddedFontLst>
     <p:embeddedFont>
-      <p:font typeface="Calibri" panose="020F0502020204030204" pitchFamily="34" charset="0"/>
+      <p:font typeface="Lucida Console" panose="020B0609040504020204" pitchFamily="49" charset="0"/>
       <p:regular r:id="rId45"/>
-      <p:bold r:id="rId46"/>
-      <p:italic r:id="rId47"/>
-      <p:boldItalic r:id="rId48"/>
-    </p:embeddedFont>
-    <p:embeddedFont>
-      <p:font typeface="Lucida Console" panose="020B0609040504020204" pitchFamily="49" charset="0"/>
-      <p:regular r:id="rId49"/>
     </p:embeddedFont>
     <p:embeddedFont>
       <p:font typeface="Cambria Math" panose="02040503050406030204" pitchFamily="18" charset="0"/>
-      <p:regular r:id="rId50"/>
+      <p:regular r:id="rId46"/>
+    </p:embeddedFont>
+    <p:embeddedFont>
+      <p:font typeface="Calibri" panose="020F0502020204030204" pitchFamily="34" charset="0"/>
+      <p:regular r:id="rId47"/>
+      <p:bold r:id="rId48"/>
+      <p:italic r:id="rId49"/>
+      <p:boldItalic r:id="rId50"/>
     </p:embeddedFont>
   </p:embeddedFontLst>
   <p:custDataLst>
@@ -578,7 +578,7 @@
           <a:p>
             <a:fld id="{AE73D398-E230-4849-ACF3-479E420CB1EA}" type="datetimeFigureOut">
               <a:rPr lang="en-GB" smtClean="0"/>
-              <a:t>01/03/2021</a:t>
+              <a:t>02/05/2021</a:t>
             </a:fld>
             <a:endParaRPr lang="en-GB"/>
           </a:p>
@@ -743,7 +743,7 @@
           <a:p>
             <a:fld id="{8410BF60-2399-471B-88B8-98E5D19A2C28}" type="datetimeFigureOut">
               <a:rPr lang="en-GB" smtClean="0"/>
-              <a:t>01/03/2021</a:t>
+              <a:t>02/05/2021</a:t>
             </a:fld>
             <a:endParaRPr lang="en-GB"/>
           </a:p>
@@ -7150,7 +7150,7 @@
           <a:p>
             <a:fld id="{8D8741C9-1E1B-4FF3-A7E9-1243E9823EB4}" type="datetime1">
               <a:rPr lang="en-US" smtClean="0"/>
-              <a:t>3/1/2021</a:t>
+              <a:t>5/2/2021</a:t>
             </a:fld>
             <a:endParaRPr lang="en-US"/>
           </a:p>
@@ -7314,7 +7314,7 @@
           <a:p>
             <a:fld id="{A612FBD6-812A-4416-A980-4B9119C35DA5}" type="datetime1">
               <a:rPr lang="en-US" smtClean="0"/>
-              <a:t>3/1/2021</a:t>
+              <a:t>5/2/2021</a:t>
             </a:fld>
             <a:endParaRPr lang="en-US"/>
           </a:p>
@@ -7488,7 +7488,7 @@
           <a:p>
             <a:fld id="{36BDB8FA-BBB8-495B-B161-4F7BDFDDEDA3}" type="datetime1">
               <a:rPr lang="en-US" smtClean="0"/>
-              <a:t>3/1/2021</a:t>
+              <a:t>5/2/2021</a:t>
             </a:fld>
             <a:endParaRPr lang="en-US"/>
           </a:p>
@@ -7654,7 +7654,7 @@
           <a:p>
             <a:fld id="{E20C214B-656F-4D67-9F4A-70D59F6620AC}" type="datetime1">
               <a:rPr lang="en-US" smtClean="0"/>
-              <a:t>3/1/2021</a:t>
+              <a:t>5/2/2021</a:t>
             </a:fld>
             <a:endParaRPr lang="en-US"/>
           </a:p>
@@ -7773,7 +7773,7 @@
           <a:p>
             <a:fld id="{E20C214B-656F-4D67-9F4A-70D59F6620AC}" type="datetime1">
               <a:rPr lang="en-US" smtClean="0"/>
-              <a:t>3/1/2021</a:t>
+              <a:t>5/2/2021</a:t>
             </a:fld>
             <a:endParaRPr lang="en-US"/>
           </a:p>
@@ -7964,7 +7964,7 @@
           <a:p>
             <a:fld id="{C75385EC-3DC5-4FB3-BD46-054AE38A1DA3}" type="datetime1">
               <a:rPr lang="en-US" smtClean="0"/>
-              <a:t>3/1/2021</a:t>
+              <a:t>5/2/2021</a:t>
             </a:fld>
             <a:endParaRPr lang="en-US"/>
           </a:p>
@@ -8205,7 +8205,7 @@
           <a:p>
             <a:fld id="{2F304D26-DE6E-4F1A-B4D1-9E6E5BEF65E2}" type="datetime1">
               <a:rPr lang="en-US" smtClean="0"/>
-              <a:t>3/1/2021</a:t>
+              <a:t>5/2/2021</a:t>
             </a:fld>
             <a:endParaRPr lang="en-US"/>
           </a:p>
@@ -8486,7 +8486,7 @@
           <a:p>
             <a:fld id="{20DF7611-242A-4AB8-BF3D-8696A364C66C}" type="datetime1">
               <a:rPr lang="en-US" smtClean="0"/>
-              <a:t>3/1/2021</a:t>
+              <a:t>5/2/2021</a:t>
             </a:fld>
             <a:endParaRPr lang="en-US"/>
           </a:p>
@@ -8901,7 +8901,7 @@
           <a:p>
             <a:fld id="{DBB8C006-CEDD-4D5A-BF40-3F5AD76685BA}" type="datetime1">
               <a:rPr lang="en-US" smtClean="0"/>
-              <a:t>3/1/2021</a:t>
+              <a:t>5/2/2021</a:t>
             </a:fld>
             <a:endParaRPr lang="en-US"/>
           </a:p>
@@ -9014,7 +9014,7 @@
           <a:p>
             <a:fld id="{203F5178-2C49-4CC5-9BF1-3EA0F730AC68}" type="datetime1">
               <a:rPr lang="en-US" smtClean="0"/>
-              <a:t>3/1/2021</a:t>
+              <a:t>5/2/2021</a:t>
             </a:fld>
             <a:endParaRPr lang="en-US"/>
           </a:p>
@@ -9105,7 +9105,7 @@
           <a:p>
             <a:fld id="{CB5083F6-940C-434A-A58D-C14A68B618CE}" type="datetime1">
               <a:rPr lang="en-US" smtClean="0"/>
-              <a:t>3/1/2021</a:t>
+              <a:t>5/2/2021</a:t>
             </a:fld>
             <a:endParaRPr lang="en-US"/>
           </a:p>
@@ -9376,7 +9376,7 @@
           <a:p>
             <a:fld id="{6B69DB20-2F70-429C-8D6F-BD64D4D77F86}" type="datetime1">
               <a:rPr lang="en-US" smtClean="0"/>
-              <a:t>3/1/2021</a:t>
+              <a:t>5/2/2021</a:t>
             </a:fld>
             <a:endParaRPr lang="en-US"/>
           </a:p>
@@ -9624,7 +9624,7 @@
           <a:p>
             <a:fld id="{C1CA00C8-74D9-48C2-9E25-45761229EB05}" type="datetime1">
               <a:rPr lang="en-US" smtClean="0"/>
-              <a:t>3/1/2021</a:t>
+              <a:t>5/2/2021</a:t>
             </a:fld>
             <a:endParaRPr lang="en-US"/>
           </a:p>
@@ -9831,7 +9831,7 @@
           <a:p>
             <a:fld id="{E20C214B-656F-4D67-9F4A-70D59F6620AC}" type="datetime1">
               <a:rPr lang="en-US" smtClean="0"/>
-              <a:t>3/1/2021</a:t>
+              <a:t>5/2/2021</a:t>
             </a:fld>
             <a:endParaRPr lang="en-US"/>
           </a:p>
@@ -15251,7 +15251,7 @@
             <a:graphicData uri="http://schemas.openxmlformats.org/presentationml/2006/ole">
               <mc:AlternateContent xmlns:mc="http://schemas.openxmlformats.org/markup-compatibility/2006">
                 <mc:Choice xmlns:v="urn:schemas-microsoft-com:vml" Requires="v">
-                  <p:oleObj spid="_x0000_s10500" name="Equation" r:id="rId4" imgW="647640" imgH="203040" progId="Equation.3">
+                  <p:oleObj spid="_x0000_s10501" name="Equation" r:id="rId4" imgW="647640" imgH="203040" progId="Equation.3">
                     <p:embed/>
                   </p:oleObj>
                 </mc:Choice>
@@ -16573,7 +16573,7 @@
               <a:buNone/>
             </a:pPr>
             <a:r>
-              <a:rPr lang="en-GB" altLang="en-US" sz="1800" dirty="0">
+              <a:rPr lang="en-US" altLang="en-US" sz="1800" dirty="0">
                 <a:solidFill>
                   <a:srgbClr val="000000"/>
                 </a:solidFill>
@@ -16583,7 +16583,7 @@
               <a:t>data:  </a:t>
             </a:r>
             <a:r>
-              <a:rPr lang="en-GB" altLang="en-US" sz="1800" dirty="0" err="1" smtClean="0">
+              <a:rPr lang="en-US" altLang="en-US" sz="1800" dirty="0" err="1">
                 <a:solidFill>
                   <a:srgbClr val="000000"/>
                 </a:solidFill>
@@ -16591,6 +16591,145 @@
                 <a:cs typeface="Courier New" pitchFamily="49" charset="0"/>
               </a:rPr>
               <a:t>plants$score</a:t>
+            </a:r>
+            <a:endParaRPr lang="en-US" altLang="en-US" sz="1800" dirty="0">
+              <a:solidFill>
+                <a:srgbClr val="000000"/>
+              </a:solidFill>
+              <a:latin typeface="Lucida Console" panose="020B0609040504020204" pitchFamily="49" charset="0"/>
+              <a:cs typeface="Courier New" pitchFamily="49" charset="0"/>
+            </a:endParaRPr>
+          </a:p>
+          <a:p>
+            <a:pPr>
+              <a:buFont typeface="Wingdings" pitchFamily="2" charset="2"/>
+              <a:buNone/>
+            </a:pPr>
+            <a:r>
+              <a:rPr lang="en-US" altLang="en-US" sz="1800" dirty="0">
+                <a:solidFill>
+                  <a:srgbClr val="000000"/>
+                </a:solidFill>
+                <a:latin typeface="Lucida Console" panose="020B0609040504020204" pitchFamily="49" charset="0"/>
+                <a:cs typeface="Courier New" pitchFamily="49" charset="0"/>
+              </a:rPr>
+              <a:t>t = 3.0411, </a:t>
+            </a:r>
+            <a:r>
+              <a:rPr lang="en-US" altLang="en-US" sz="1800" dirty="0" err="1">
+                <a:solidFill>
+                  <a:srgbClr val="000000"/>
+                </a:solidFill>
+                <a:latin typeface="Lucida Console" panose="020B0609040504020204" pitchFamily="49" charset="0"/>
+                <a:cs typeface="Courier New" pitchFamily="49" charset="0"/>
+              </a:rPr>
+              <a:t>df</a:t>
+            </a:r>
+            <a:r>
+              <a:rPr lang="en-US" altLang="en-US" sz="1800" dirty="0">
+                <a:solidFill>
+                  <a:srgbClr val="000000"/>
+                </a:solidFill>
+                <a:latin typeface="Lucida Console" panose="020B0609040504020204" pitchFamily="49" charset="0"/>
+                <a:cs typeface="Courier New" pitchFamily="49" charset="0"/>
+              </a:rPr>
+              <a:t> = 19, p-value = 0.006721</a:t>
+            </a:r>
+          </a:p>
+          <a:p>
+            <a:pPr>
+              <a:buFont typeface="Wingdings" pitchFamily="2" charset="2"/>
+              <a:buNone/>
+            </a:pPr>
+            <a:r>
+              <a:rPr lang="en-US" altLang="en-US" sz="1800" dirty="0">
+                <a:solidFill>
+                  <a:srgbClr val="000000"/>
+                </a:solidFill>
+                <a:latin typeface="Lucida Console" panose="020B0609040504020204" pitchFamily="49" charset="0"/>
+                <a:cs typeface="Courier New" pitchFamily="49" charset="0"/>
+              </a:rPr>
+              <a:t>alternative hypothesis: true mean is not equal to 76</a:t>
+            </a:r>
+          </a:p>
+          <a:p>
+            <a:pPr>
+              <a:buFont typeface="Wingdings" pitchFamily="2" charset="2"/>
+              <a:buNone/>
+            </a:pPr>
+            <a:r>
+              <a:rPr lang="en-US" altLang="en-US" sz="1800" dirty="0">
+                <a:solidFill>
+                  <a:srgbClr val="000000"/>
+                </a:solidFill>
+                <a:latin typeface="Lucida Console" panose="020B0609040504020204" pitchFamily="49" charset="0"/>
+                <a:cs typeface="Courier New" pitchFamily="49" charset="0"/>
+              </a:rPr>
+              <a:t>95 percent confidence interval:</a:t>
+            </a:r>
+          </a:p>
+          <a:p>
+            <a:pPr>
+              <a:buFont typeface="Wingdings" pitchFamily="2" charset="2"/>
+              <a:buNone/>
+            </a:pPr>
+            <a:r>
+              <a:rPr lang="en-US" altLang="en-US" sz="1800" dirty="0">
+                <a:solidFill>
+                  <a:srgbClr val="000000"/>
+                </a:solidFill>
+                <a:latin typeface="Lucida Console" panose="020B0609040504020204" pitchFamily="49" charset="0"/>
+                <a:cs typeface="Courier New" pitchFamily="49" charset="0"/>
+              </a:rPr>
+              <a:t> 77.80908 85.79692</a:t>
+            </a:r>
+          </a:p>
+          <a:p>
+            <a:pPr>
+              <a:buFont typeface="Wingdings" pitchFamily="2" charset="2"/>
+              <a:buNone/>
+            </a:pPr>
+            <a:r>
+              <a:rPr lang="en-US" altLang="en-US" sz="1800" dirty="0">
+                <a:solidFill>
+                  <a:srgbClr val="000000"/>
+                </a:solidFill>
+                <a:latin typeface="Lucida Console" panose="020B0609040504020204" pitchFamily="49" charset="0"/>
+                <a:cs typeface="Courier New" pitchFamily="49" charset="0"/>
+              </a:rPr>
+              <a:t>sample estimates:</a:t>
+            </a:r>
+          </a:p>
+          <a:p>
+            <a:pPr>
+              <a:buFont typeface="Wingdings" pitchFamily="2" charset="2"/>
+              <a:buNone/>
+            </a:pPr>
+            <a:r>
+              <a:rPr lang="en-US" altLang="en-US" sz="1800" dirty="0">
+                <a:solidFill>
+                  <a:srgbClr val="000000"/>
+                </a:solidFill>
+                <a:latin typeface="Lucida Console" panose="020B0609040504020204" pitchFamily="49" charset="0"/>
+                <a:cs typeface="Courier New" pitchFamily="49" charset="0"/>
+              </a:rPr>
+              <a:t>mean of x </a:t>
+            </a:r>
+          </a:p>
+          <a:p>
+            <a:pPr>
+              <a:buFont typeface="Wingdings" pitchFamily="2" charset="2"/>
+              <a:buNone/>
+            </a:pPr>
+            <a:r>
+              <a:rPr lang="en-US" altLang="en-US" sz="1800" dirty="0">
+                <a:solidFill>
+                  <a:srgbClr val="000000"/>
+                </a:solidFill>
+                <a:latin typeface="Lucida Console" panose="020B0609040504020204" pitchFamily="49" charset="0"/>
+                <a:cs typeface="Courier New" pitchFamily="49" charset="0"/>
+              </a:rPr>
+              <a:t>   81.803 </a:t>
             </a:r>
             <a:endParaRPr lang="en-GB" altLang="en-US" sz="1800" dirty="0">
               <a:solidFill>
@@ -16599,155 +16738,6 @@
               <a:latin typeface="Lucida Console" panose="020B0609040504020204" pitchFamily="49" charset="0"/>
               <a:cs typeface="Courier New" pitchFamily="49" charset="0"/>
             </a:endParaRPr>
-          </a:p>
-          <a:p>
-            <a:pPr>
-              <a:buFont typeface="Wingdings" pitchFamily="2" charset="2"/>
-              <a:buNone/>
-            </a:pPr>
-            <a:r>
-              <a:rPr lang="en-GB" altLang="en-US" sz="1800" dirty="0">
-                <a:solidFill>
-                  <a:srgbClr val="000000"/>
-                </a:solidFill>
-                <a:latin typeface="Lucida Console" panose="020B0609040504020204" pitchFamily="49" charset="0"/>
-                <a:cs typeface="Courier New" pitchFamily="49" charset="0"/>
-              </a:rPr>
-              <a:t>t = 2.517, </a:t>
-            </a:r>
-            <a:r>
-              <a:rPr lang="en-GB" altLang="en-US" sz="1800" dirty="0" err="1">
-                <a:solidFill>
-                  <a:srgbClr val="000000"/>
-                </a:solidFill>
-                <a:latin typeface="Lucida Console" panose="020B0609040504020204" pitchFamily="49" charset="0"/>
-                <a:cs typeface="Courier New" pitchFamily="49" charset="0"/>
-              </a:rPr>
-              <a:t>df</a:t>
-            </a:r>
-            <a:r>
-              <a:rPr lang="en-GB" altLang="en-US" sz="1800" dirty="0">
-                <a:solidFill>
-                  <a:srgbClr val="000000"/>
-                </a:solidFill>
-                <a:latin typeface="Lucida Console" panose="020B0609040504020204" pitchFamily="49" charset="0"/>
-                <a:cs typeface="Courier New" pitchFamily="49" charset="0"/>
-              </a:rPr>
-              <a:t> = 19, p-value = 0.02097</a:t>
-            </a:r>
-          </a:p>
-          <a:p>
-            <a:pPr>
-              <a:buFont typeface="Wingdings" pitchFamily="2" charset="2"/>
-              <a:buNone/>
-            </a:pPr>
-            <a:r>
-              <a:rPr lang="en-GB" altLang="en-US" sz="1800" dirty="0">
-                <a:solidFill>
-                  <a:srgbClr val="000000"/>
-                </a:solidFill>
-                <a:latin typeface="Lucida Console" panose="020B0609040504020204" pitchFamily="49" charset="0"/>
-                <a:cs typeface="Courier New" pitchFamily="49" charset="0"/>
-              </a:rPr>
-              <a:t>alternative hypothesis: true mean is not equal to </a:t>
-            </a:r>
-            <a:r>
-              <a:rPr lang="en-GB" altLang="en-US" sz="1800" dirty="0" smtClean="0">
-                <a:solidFill>
-                  <a:srgbClr val="000000"/>
-                </a:solidFill>
-                <a:latin typeface="Lucida Console" panose="020B0609040504020204" pitchFamily="49" charset="0"/>
-                <a:cs typeface="Courier New" pitchFamily="49" charset="0"/>
-              </a:rPr>
-              <a:t>76</a:t>
-            </a:r>
-            <a:endParaRPr lang="en-GB" altLang="en-US" sz="1800" dirty="0">
-              <a:solidFill>
-                <a:srgbClr val="000000"/>
-              </a:solidFill>
-              <a:latin typeface="Lucida Console" panose="020B0609040504020204" pitchFamily="49" charset="0"/>
-              <a:cs typeface="Courier New" pitchFamily="49" charset="0"/>
-            </a:endParaRPr>
-          </a:p>
-          <a:p>
-            <a:pPr>
-              <a:buFont typeface="Wingdings" pitchFamily="2" charset="2"/>
-              <a:buNone/>
-            </a:pPr>
-            <a:r>
-              <a:rPr lang="en-GB" altLang="en-US" sz="1800" dirty="0">
-                <a:solidFill>
-                  <a:srgbClr val="000000"/>
-                </a:solidFill>
-                <a:latin typeface="Lucida Console" panose="020B0609040504020204" pitchFamily="49" charset="0"/>
-                <a:cs typeface="Courier New" pitchFamily="49" charset="0"/>
-              </a:rPr>
-              <a:t>95 percent confidence interval:</a:t>
-            </a:r>
-          </a:p>
-          <a:p>
-            <a:pPr>
-              <a:buFont typeface="Wingdings" pitchFamily="2" charset="2"/>
-              <a:buNone/>
-            </a:pPr>
-            <a:r>
-              <a:rPr lang="en-GB" altLang="en-US" sz="1800" dirty="0">
-                <a:solidFill>
-                  <a:srgbClr val="000000"/>
-                </a:solidFill>
-                <a:latin typeface="Lucida Console" panose="020B0609040504020204" pitchFamily="49" charset="0"/>
-                <a:cs typeface="Courier New" pitchFamily="49" charset="0"/>
-              </a:rPr>
-              <a:t> 77.80908 85.79692</a:t>
-            </a:r>
-          </a:p>
-          <a:p>
-            <a:pPr>
-              <a:buFont typeface="Wingdings" pitchFamily="2" charset="2"/>
-              <a:buNone/>
-            </a:pPr>
-            <a:r>
-              <a:rPr lang="en-GB" altLang="en-US" sz="1800" dirty="0">
-                <a:solidFill>
-                  <a:srgbClr val="000000"/>
-                </a:solidFill>
-                <a:latin typeface="Lucida Console" panose="020B0609040504020204" pitchFamily="49" charset="0"/>
-                <a:cs typeface="Courier New" pitchFamily="49" charset="0"/>
-              </a:rPr>
-              <a:t>sample estimates:</a:t>
-            </a:r>
-          </a:p>
-          <a:p>
-            <a:pPr>
-              <a:buFont typeface="Wingdings" pitchFamily="2" charset="2"/>
-              <a:buNone/>
-            </a:pPr>
-            <a:r>
-              <a:rPr lang="en-GB" altLang="en-US" sz="1800" dirty="0">
-                <a:solidFill>
-                  <a:srgbClr val="000000"/>
-                </a:solidFill>
-                <a:latin typeface="Lucida Console" panose="020B0609040504020204" pitchFamily="49" charset="0"/>
-                <a:cs typeface="Courier New" pitchFamily="49" charset="0"/>
-              </a:rPr>
-              <a:t>mean of x </a:t>
-            </a:r>
-          </a:p>
-          <a:p>
-            <a:pPr>
-              <a:buFont typeface="Wingdings" pitchFamily="2" charset="2"/>
-              <a:buNone/>
-            </a:pPr>
-            <a:r>
-              <a:rPr lang="en-GB" altLang="en-US" sz="1800" dirty="0">
-                <a:solidFill>
-                  <a:srgbClr val="000000"/>
-                </a:solidFill>
-                <a:latin typeface="Lucida Console" panose="020B0609040504020204" pitchFamily="49" charset="0"/>
-                <a:cs typeface="Courier New" pitchFamily="49" charset="0"/>
-              </a:rPr>
-              <a:t>   81.803 </a:t>
-            </a:r>
           </a:p>
         </p:txBody>
       </p:sp>
@@ -17803,7 +17793,7 @@
       </p:sp>
       <p:pic>
         <p:nvPicPr>
-          <p:cNvPr id="8" name="Picture 7"/>
+          <p:cNvPr id="4" name="Picture 3"/>
           <p:cNvPicPr>
             <a:picLocks noChangeAspect="1"/>
           </p:cNvPicPr>
@@ -17817,8 +17807,8 @@
         </p:blipFill>
         <p:spPr>
           <a:xfrm>
-            <a:off x="4858933" y="3581400"/>
-            <a:ext cx="3555571" cy="2749642"/>
+            <a:off x="5039170" y="3276074"/>
+            <a:ext cx="3571429" cy="3047619"/>
           </a:xfrm>
           <a:prstGeom prst="rect">
             <a:avLst/>
@@ -18660,8 +18650,8 @@
           </a:p>
         </p:txBody>
       </p:sp>
-      <mc:AlternateContent xmlns:mc="http://schemas.openxmlformats.org/markup-compatibility/2006" xmlns:a14="http://schemas.microsoft.com/office/drawing/2010/main">
-        <mc:Choice Requires="a14">
+      <mc:AlternateContent xmlns:mc="http://schemas.openxmlformats.org/markup-compatibility/2006">
+        <mc:Choice xmlns:a14="http://schemas.microsoft.com/office/drawing/2010/main" Requires="a14">
           <p:sp>
             <p:nvSpPr>
               <p:cNvPr id="6147" name="Rectangle 3"/>
@@ -18741,7 +18731,11 @@
                 </a:r>
                 <a:r>
                   <a:rPr lang="en-GB" sz="3600" dirty="0" smtClean="0"/>
-                  <a:t>2.52; </a:t>
+                  <a:t>3</a:t>
+                </a:r>
+                <a:r>
+                  <a:rPr lang="en-GB" sz="3600" dirty="0" smtClean="0"/>
+                  <a:t>.04; </a:t>
                 </a:r>
                 <a:r>
                   <a:rPr lang="en-GB" sz="3600" i="1" dirty="0" err="1"/>
@@ -18760,19 +18754,19 @@
                   <a:t>p </a:t>
                 </a:r>
                 <a:r>
-                  <a:rPr lang="en-GB" sz="3600" dirty="0"/>
+                  <a:rPr lang="en-GB" sz="3600"/>
                   <a:t>= </a:t>
                 </a:r>
                 <a:r>
-                  <a:rPr lang="en-GB" sz="3600" dirty="0" smtClean="0"/>
-                  <a:t>0.021).</a:t>
+                  <a:rPr lang="en-GB" sz="3600" smtClean="0"/>
+                  <a:t>0.0067).</a:t>
                 </a:r>
                 <a:endParaRPr lang="en-GB" sz="3600" dirty="0"/>
               </a:p>
             </p:txBody>
           </p:sp>
         </mc:Choice>
-        <mc:Fallback xmlns="">
+        <mc:Fallback>
           <p:sp>
             <p:nvSpPr>
               <p:cNvPr id="6147" name="Rectangle 3"/>

</xml_diff>